<commit_message>
A few docs changed
</commit_message>
<xml_diff>
--- a/Lib/MME.pptx
+++ b/Lib/MME.pptx
@@ -3322,22 +3322,11 @@
                 </a:rPr>
                 <a:t>Custom</a:t>
               </a:r>
-              <a:endParaRPr lang="da-DK" sz="1200" dirty="0" smtClean="0">
-                <a:latin typeface="Verdana" pitchFamily="34" charset="0"/>
-              </a:endParaRPr>
-            </a:p>
-            <a:p>
               <a:r>
                 <a:rPr lang="da-DK" sz="1200" dirty="0" smtClean="0">
                   <a:latin typeface="Verdana" pitchFamily="34" charset="0"/>
                 </a:rPr>
-                <a:t>MME </a:t>
-              </a:r>
-              <a:r>
-                <a:rPr lang="da-DK" sz="1200" dirty="0" err="1" smtClean="0">
-                  <a:latin typeface="Verdana" pitchFamily="34" charset="0"/>
-                </a:rPr>
-                <a:t>AddIn</a:t>
+                <a:t> MME</a:t>
               </a:r>
               <a:endParaRPr lang="da-DK" sz="1200" dirty="0">
                 <a:latin typeface="Verdana" pitchFamily="34" charset="0"/>
@@ -3590,22 +3579,11 @@
                 </a:rPr>
                 <a:t>Custom</a:t>
               </a:r>
-              <a:endParaRPr lang="da-DK" sz="1200" dirty="0" smtClean="0">
-                <a:latin typeface="Verdana" pitchFamily="34" charset="0"/>
-              </a:endParaRPr>
-            </a:p>
-            <a:p>
               <a:r>
                 <a:rPr lang="da-DK" sz="1200" dirty="0" smtClean="0">
                   <a:latin typeface="Verdana" pitchFamily="34" charset="0"/>
                 </a:rPr>
-                <a:t>MME </a:t>
-              </a:r>
-              <a:r>
-                <a:rPr lang="da-DK" sz="1200" dirty="0" err="1" smtClean="0">
-                  <a:latin typeface="Verdana" pitchFamily="34" charset="0"/>
-                </a:rPr>
-                <a:t>AddIn</a:t>
+                <a:t> MME</a:t>
               </a:r>
               <a:endParaRPr lang="da-DK" sz="1200" dirty="0">
                 <a:latin typeface="Verdana" pitchFamily="34" charset="0"/>
@@ -3708,22 +3686,11 @@
                 </a:rPr>
                 <a:t>Custom</a:t>
               </a:r>
-              <a:endParaRPr lang="da-DK" sz="1200" dirty="0" smtClean="0">
-                <a:latin typeface="Verdana" pitchFamily="34" charset="0"/>
-              </a:endParaRPr>
-            </a:p>
-            <a:p>
               <a:r>
                 <a:rPr lang="da-DK" sz="1200" dirty="0" smtClean="0">
                   <a:latin typeface="Verdana" pitchFamily="34" charset="0"/>
                 </a:rPr>
-                <a:t>MME </a:t>
-              </a:r>
-              <a:r>
-                <a:rPr lang="da-DK" sz="1200" dirty="0" err="1" smtClean="0">
-                  <a:latin typeface="Verdana" pitchFamily="34" charset="0"/>
-                </a:rPr>
-                <a:t>AddIn</a:t>
+                <a:t> MME</a:t>
               </a:r>
               <a:endParaRPr lang="da-DK" sz="1200" dirty="0">
                 <a:latin typeface="Verdana" pitchFamily="34" charset="0"/>

</xml_diff>